<commit_message>
Diagrama de Entidades Corregido
</commit_message>
<xml_diff>
--- a/DISEÑO/Prototipos.pptx
+++ b/DISEÑO/Prototipos.pptx
@@ -587,7 +587,7 @@
           <a:p>
             <a:fld id="{45FF07E4-3ED2-42DE-B955-98E77E61CCF0}" type="datetimeFigureOut">
               <a:rPr lang="es-ES_tradnl" smtClean="0"/>
-              <a:t>17/09/2021</a:t>
+              <a:t>09/10/2021</a:t>
             </a:fld>
             <a:endParaRPr lang="es-ES_tradnl"/>
           </a:p>
@@ -950,7 +950,7 @@
           <a:effectLst/>
           <a:extLst>
             <a:ext uri="{91240B29-F687-4f45-9708-019B960494DF}">
-              <a14:hiddenLine xmlns="" xmlns:a14="http://schemas.microsoft.com/office/drawing/2010/main" w="9525">
+              <a14:hiddenLine xmlns:a14="http://schemas.microsoft.com/office/drawing/2010/main" xmlns="" w="9525">
                 <a:solidFill>
                   <a:srgbClr val="000000"/>
                 </a:solidFill>
@@ -1142,7 +1142,7 @@
           <a:p>
             <a:fld id="{D8F82E45-2667-4915-81AA-1C376FC2762F}" type="datetimeFigureOut">
               <a:rPr lang="es-ES_tradnl" smtClean="0"/>
-              <a:t>17/09/2021</a:t>
+              <a:t>09/10/2021</a:t>
             </a:fld>
             <a:endParaRPr lang="es-ES_tradnl"/>
           </a:p>
@@ -1460,7 +1460,7 @@
           <a:p>
             <a:fld id="{D8F82E45-2667-4915-81AA-1C376FC2762F}" type="datetimeFigureOut">
               <a:rPr lang="es-ES_tradnl" smtClean="0"/>
-              <a:t>17/09/2021</a:t>
+              <a:t>09/10/2021</a:t>
             </a:fld>
             <a:endParaRPr lang="es-ES_tradnl"/>
           </a:p>
@@ -1948,7 +1948,7 @@
           <a:p>
             <a:fld id="{D8F82E45-2667-4915-81AA-1C376FC2762F}" type="datetimeFigureOut">
               <a:rPr lang="es-ES_tradnl" smtClean="0"/>
-              <a:t>17/09/2021</a:t>
+              <a:t>09/10/2021</a:t>
             </a:fld>
             <a:endParaRPr lang="es-ES_tradnl"/>
           </a:p>
@@ -2317,7 +2317,7 @@
           <a:p>
             <a:fld id="{D8F82E45-2667-4915-81AA-1C376FC2762F}" type="datetimeFigureOut">
               <a:rPr lang="es-ES_tradnl" smtClean="0"/>
-              <a:t>17/09/2021</a:t>
+              <a:t>09/10/2021</a:t>
             </a:fld>
             <a:endParaRPr lang="es-ES_tradnl"/>
           </a:p>
@@ -2472,7 +2472,7 @@
           <a:ln/>
           <a:extLst>
             <a:ext uri="{91240B29-F687-4f45-9708-019B960494DF}">
-              <a14:hiddenLine xmlns="" xmlns:a14="http://schemas.microsoft.com/office/drawing/2010/main" w="9525">
+              <a14:hiddenLine xmlns:a14="http://schemas.microsoft.com/office/drawing/2010/main" xmlns="" w="9525">
                 <a:solidFill>
                   <a:srgbClr val="000000"/>
                 </a:solidFill>
@@ -2590,7 +2590,7 @@
           <a:p>
             <a:fld id="{D8F82E45-2667-4915-81AA-1C376FC2762F}" type="datetimeFigureOut">
               <a:rPr lang="es-ES_tradnl" smtClean="0"/>
-              <a:t>17/09/2021</a:t>
+              <a:t>09/10/2021</a:t>
             </a:fld>
             <a:endParaRPr lang="es-ES_tradnl"/>
           </a:p>
@@ -2747,7 +2747,7 @@
           <a:ln/>
           <a:extLst>
             <a:ext uri="{91240B29-F687-4f45-9708-019B960494DF}">
-              <a14:hiddenLine xmlns="" xmlns:a14="http://schemas.microsoft.com/office/drawing/2010/main" w="9525">
+              <a14:hiddenLine xmlns:a14="http://schemas.microsoft.com/office/drawing/2010/main" xmlns="" w="9525">
                 <a:solidFill>
                   <a:srgbClr val="000000"/>
                 </a:solidFill>
@@ -2875,7 +2875,7 @@
           <a:p>
             <a:fld id="{D8F82E45-2667-4915-81AA-1C376FC2762F}" type="datetimeFigureOut">
               <a:rPr lang="es-ES_tradnl" smtClean="0"/>
-              <a:t>17/09/2021</a:t>
+              <a:t>09/10/2021</a:t>
             </a:fld>
             <a:endParaRPr lang="es-ES_tradnl"/>
           </a:p>
@@ -3030,7 +3030,7 @@
           <a:ln/>
           <a:extLst>
             <a:ext uri="{91240B29-F687-4f45-9708-019B960494DF}">
-              <a14:hiddenLine xmlns="" xmlns:a14="http://schemas.microsoft.com/office/drawing/2010/main" w="9525">
+              <a14:hiddenLine xmlns:a14="http://schemas.microsoft.com/office/drawing/2010/main" xmlns="" w="9525">
                 <a:solidFill>
                   <a:srgbClr val="000000"/>
                 </a:solidFill>
@@ -3158,7 +3158,7 @@
           <a:p>
             <a:fld id="{D8F82E45-2667-4915-81AA-1C376FC2762F}" type="datetimeFigureOut">
               <a:rPr lang="es-ES_tradnl" smtClean="0"/>
-              <a:t>17/09/2021</a:t>
+              <a:t>09/10/2021</a:t>
             </a:fld>
             <a:endParaRPr lang="es-ES_tradnl"/>
           </a:p>
@@ -3501,7 +3501,7 @@
           <a:p>
             <a:fld id="{D8F82E45-2667-4915-81AA-1C376FC2762F}" type="datetimeFigureOut">
               <a:rPr lang="es-ES_tradnl" smtClean="0"/>
-              <a:t>17/09/2021</a:t>
+              <a:t>09/10/2021</a:t>
             </a:fld>
             <a:endParaRPr lang="es-ES_tradnl"/>
           </a:p>
@@ -3656,7 +3656,7 @@
           <a:ln/>
           <a:extLst>
             <a:ext uri="{91240B29-F687-4f45-9708-019B960494DF}">
-              <a14:hiddenLine xmlns="" xmlns:a14="http://schemas.microsoft.com/office/drawing/2010/main" w="9525">
+              <a14:hiddenLine xmlns:a14="http://schemas.microsoft.com/office/drawing/2010/main" xmlns="" w="9525">
                 <a:solidFill>
                   <a:srgbClr val="000000"/>
                 </a:solidFill>
@@ -3840,7 +3840,7 @@
           <a:p>
             <a:fld id="{D8F82E45-2667-4915-81AA-1C376FC2762F}" type="datetimeFigureOut">
               <a:rPr lang="es-ES_tradnl" smtClean="0"/>
-              <a:t>17/09/2021</a:t>
+              <a:t>09/10/2021</a:t>
             </a:fld>
             <a:endParaRPr lang="es-ES_tradnl"/>
           </a:p>
@@ -3995,7 +3995,7 @@
           <a:ln/>
           <a:extLst>
             <a:ext uri="{91240B29-F687-4f45-9708-019B960494DF}">
-              <a14:hiddenLine xmlns="" xmlns:a14="http://schemas.microsoft.com/office/drawing/2010/main" w="9525">
+              <a14:hiddenLine xmlns:a14="http://schemas.microsoft.com/office/drawing/2010/main" xmlns="" w="9525">
                 <a:solidFill>
                   <a:srgbClr val="000000"/>
                 </a:solidFill>
@@ -4317,7 +4317,7 @@
           <a:p>
             <a:fld id="{D8F82E45-2667-4915-81AA-1C376FC2762F}" type="datetimeFigureOut">
               <a:rPr lang="es-ES_tradnl" smtClean="0"/>
-              <a:t>17/09/2021</a:t>
+              <a:t>09/10/2021</a:t>
             </a:fld>
             <a:endParaRPr lang="es-ES_tradnl"/>
           </a:p>
@@ -4472,7 +4472,7 @@
           <a:ln/>
           <a:extLst>
             <a:ext uri="{91240B29-F687-4f45-9708-019B960494DF}">
-              <a14:hiddenLine xmlns="" xmlns:a14="http://schemas.microsoft.com/office/drawing/2010/main" w="9525">
+              <a14:hiddenLine xmlns:a14="http://schemas.microsoft.com/office/drawing/2010/main" xmlns="" w="9525">
                 <a:solidFill>
                   <a:srgbClr val="000000"/>
                 </a:solidFill>
@@ -4538,7 +4538,7 @@
           <a:p>
             <a:fld id="{D8F82E45-2667-4915-81AA-1C376FC2762F}" type="datetimeFigureOut">
               <a:rPr lang="es-ES_tradnl" smtClean="0"/>
-              <a:t>17/09/2021</a:t>
+              <a:t>09/10/2021</a:t>
             </a:fld>
             <a:endParaRPr lang="es-ES_tradnl"/>
           </a:p>
@@ -4633,7 +4633,7 @@
           <a:p>
             <a:fld id="{D8F82E45-2667-4915-81AA-1C376FC2762F}" type="datetimeFigureOut">
               <a:rPr lang="es-ES_tradnl" smtClean="0"/>
-              <a:t>17/09/2021</a:t>
+              <a:t>09/10/2021</a:t>
             </a:fld>
             <a:endParaRPr lang="es-ES_tradnl"/>
           </a:p>
@@ -4901,7 +4901,7 @@
           <a:ln/>
           <a:extLst>
             <a:ext uri="{91240B29-F687-4f45-9708-019B960494DF}">
-              <a14:hiddenLine xmlns="" xmlns:a14="http://schemas.microsoft.com/office/drawing/2010/main" w="9525">
+              <a14:hiddenLine xmlns:a14="http://schemas.microsoft.com/office/drawing/2010/main" xmlns="" w="9525">
                 <a:solidFill>
                   <a:srgbClr val="000000"/>
                 </a:solidFill>
@@ -5100,7 +5100,7 @@
           <a:p>
             <a:fld id="{D8F82E45-2667-4915-81AA-1C376FC2762F}" type="datetimeFigureOut">
               <a:rPr lang="es-ES_tradnl" smtClean="0"/>
-              <a:t>17/09/2021</a:t>
+              <a:t>09/10/2021</a:t>
             </a:fld>
             <a:endParaRPr lang="es-ES_tradnl"/>
           </a:p>
@@ -5413,7 +5413,7 @@
           <a:p>
             <a:fld id="{D8F82E45-2667-4915-81AA-1C376FC2762F}" type="datetimeFigureOut">
               <a:rPr lang="es-ES_tradnl" smtClean="0"/>
-              <a:t>17/09/2021</a:t>
+              <a:t>09/10/2021</a:t>
             </a:fld>
             <a:endParaRPr lang="es-ES_tradnl"/>
           </a:p>
@@ -5683,7 +5683,7 @@
           <a:p>
             <a:fld id="{D8F82E45-2667-4915-81AA-1C376FC2762F}" type="datetimeFigureOut">
               <a:rPr lang="es-ES_tradnl" smtClean="0"/>
-              <a:t>17/09/2021</a:t>
+              <a:t>09/10/2021</a:t>
             </a:fld>
             <a:endParaRPr lang="es-ES_tradnl"/>
           </a:p>
@@ -6180,7 +6180,7 @@
                   </a:outerShdw>
                 </a:effectLst>
               </a:rPr>
-              <a:t>Prototype Tactic Soccer</a:t>
+              <a:t>Prototype Soccer Manager</a:t>
             </a:r>
           </a:p>
         </p:txBody>
@@ -8870,6 +8870,134 @@
                   </a:innerShdw>
                 </a:effectLst>
               </a:rPr>
+              <a:t> y </a:t>
+            </a:r>
+            <a:r>
+              <a:rPr lang="en-US" sz="4400" b="1" spc="50" dirty="0" err="1">
+                <a:ln w="0"/>
+                <a:solidFill>
+                  <a:schemeClr val="bg2"/>
+                </a:solidFill>
+                <a:effectLst>
+                  <a:innerShdw blurRad="63500" dist="50800" dir="13500000">
+                    <a:srgbClr val="000000">
+                      <a:alpha val="50000"/>
+                    </a:srgbClr>
+                  </a:innerShdw>
+                </a:effectLst>
+              </a:rPr>
+              <a:t>alcance</a:t>
+            </a:r>
+            <a:r>
+              <a:rPr lang="en-US" sz="4400" b="1" spc="50" dirty="0">
+                <a:ln w="0"/>
+                <a:solidFill>
+                  <a:schemeClr val="bg2"/>
+                </a:solidFill>
+                <a:effectLst>
+                  <a:innerShdw blurRad="63500" dist="50800" dir="13500000">
+                    <a:srgbClr val="000000">
+                      <a:alpha val="50000"/>
+                    </a:srgbClr>
+                  </a:innerShdw>
+                </a:effectLst>
+              </a:rPr>
+              <a:t> </a:t>
+            </a:r>
+            <a:r>
+              <a:rPr lang="en-US" sz="4400" b="1" spc="50" dirty="0" err="1">
+                <a:ln w="0"/>
+                <a:solidFill>
+                  <a:schemeClr val="bg2"/>
+                </a:solidFill>
+                <a:effectLst>
+                  <a:innerShdw blurRad="63500" dist="50800" dir="13500000">
+                    <a:srgbClr val="000000">
+                      <a:alpha val="50000"/>
+                    </a:srgbClr>
+                  </a:innerShdw>
+                </a:effectLst>
+              </a:rPr>
+              <a:t>deld</a:t>
+            </a:r>
+            <a:r>
+              <a:rPr lang="en-US" sz="4400" b="1" spc="50" dirty="0">
+                <a:ln w="0"/>
+                <a:solidFill>
+                  <a:schemeClr val="bg2"/>
+                </a:solidFill>
+                <a:effectLst>
+                  <a:innerShdw blurRad="63500" dist="50800" dir="13500000">
+                    <a:srgbClr val="000000">
+                      <a:alpha val="50000"/>
+                    </a:srgbClr>
+                  </a:innerShdw>
+                </a:effectLst>
+              </a:rPr>
+              <a:t> </a:t>
+            </a:r>
+            <a:r>
+              <a:rPr lang="en-US" sz="4400" b="1" spc="50" dirty="0" err="1">
+                <a:ln w="0"/>
+                <a:solidFill>
+                  <a:schemeClr val="bg2"/>
+                </a:solidFill>
+                <a:effectLst>
+                  <a:innerShdw blurRad="63500" dist="50800" dir="13500000">
+                    <a:srgbClr val="000000">
+                      <a:alpha val="50000"/>
+                    </a:srgbClr>
+                  </a:innerShdw>
+                </a:effectLst>
+              </a:rPr>
+              <a:t>esarrolo</a:t>
+            </a:r>
+            <a:r>
+              <a:rPr lang="en-US" sz="4400" b="1" spc="50" dirty="0">
+                <a:ln w="0"/>
+                <a:solidFill>
+                  <a:schemeClr val="bg2"/>
+                </a:solidFill>
+                <a:effectLst>
+                  <a:innerShdw blurRad="63500" dist="50800" dir="13500000">
+                    <a:srgbClr val="000000">
+                      <a:alpha val="50000"/>
+                    </a:srgbClr>
+                  </a:innerShdw>
+                </a:effectLst>
+              </a:rPr>
+              <a:t> a </a:t>
+            </a:r>
+            <a:r>
+              <a:rPr lang="en-US" sz="4400" b="1" spc="50" dirty="0" err="1">
+                <a:ln w="0"/>
+                <a:solidFill>
+                  <a:schemeClr val="bg2"/>
+                </a:solidFill>
+                <a:effectLst>
+                  <a:innerShdw blurRad="63500" dist="50800" dir="13500000">
+                    <a:srgbClr val="000000">
+                      <a:alpha val="50000"/>
+                    </a:srgbClr>
+                  </a:innerShdw>
+                </a:effectLst>
+              </a:rPr>
+              <a:t>obtener</a:t>
+            </a:r>
+            <a:r>
+              <a:rPr lang="en-US" sz="4400" b="1" spc="50" dirty="0">
+                <a:ln w="0"/>
+                <a:solidFill>
+                  <a:schemeClr val="bg2"/>
+                </a:solidFill>
+                <a:effectLst>
+                  <a:innerShdw blurRad="63500" dist="50800" dir="13500000">
+                    <a:srgbClr val="000000">
+                      <a:alpha val="50000"/>
+                    </a:srgbClr>
+                  </a:innerShdw>
+                </a:effectLst>
+              </a:rPr>
               <a:t> de la </a:t>
             </a:r>
             <a:r>
@@ -9031,7 +9159,7 @@
         </p:blipFill>
         <p:spPr>
           <a:xfrm>
-            <a:off x="9856116" y="3518622"/>
+            <a:off x="9989526" y="3679100"/>
             <a:ext cx="1817078" cy="1817078"/>
           </a:xfrm>
           <a:prstGeom prst="rect">
@@ -13795,7 +13923,7 @@
         <p:spPr>
           <a:xfrm>
             <a:off x="385396" y="1390929"/>
-            <a:ext cx="11421208" cy="923330"/>
+            <a:ext cx="11421208" cy="1323439"/>
           </a:xfrm>
           <a:prstGeom prst="rect">
             <a:avLst/>
@@ -13810,7 +13938,7 @@
           <a:p>
             <a:pPr algn="ctr"/>
             <a:r>
-              <a:rPr lang="en-US" sz="5400" b="1" dirty="0">
+              <a:rPr lang="en-US" sz="8000" b="1" dirty="0">
                 <a:ln w="9525">
                   <a:solidFill>
                     <a:schemeClr val="bg1"/>
@@ -13825,7 +13953,7 @@
                   </a:outerShdw>
                 </a:effectLst>
               </a:rPr>
-              <a:t>Manager Soccer</a:t>
+              <a:t>Soccer Manager</a:t>
             </a:r>
           </a:p>
         </p:txBody>
@@ -13989,10 +14117,10 @@
       </p:sp>
       <p:sp>
         <p:nvSpPr>
-          <p:cNvPr id="2" name="Rectangle 1">
+          <p:cNvPr id="7" name="Rectangle 6">
             <a:extLst>
               <a:ext uri="{FF2B5EF4-FFF2-40B4-BE49-F238E27FC236}">
-                <a16:creationId xmlns:a16="http://schemas.microsoft.com/office/drawing/2014/main" id="{71E7D663-295B-4050-8C99-03ED1D9AA026}"/>
+                <a16:creationId xmlns:a16="http://schemas.microsoft.com/office/drawing/2014/main" id="{D4099683-2B56-4402-860F-CE215F42AB6C}"/>
               </a:ext>
             </a:extLst>
           </p:cNvPr>
@@ -14001,7 +14129,7 @@
         </p:nvSpPr>
         <p:spPr>
           <a:xfrm>
-            <a:off x="385396" y="272177"/>
+            <a:off x="134818" y="993998"/>
             <a:ext cx="11421208" cy="923330"/>
           </a:xfrm>
           <a:prstGeom prst="rect">
@@ -14032,107 +14160,7 @@
                   </a:outerShdw>
                 </a:effectLst>
               </a:rPr>
-              <a:t>Tactics Soccer</a:t>
-            </a:r>
-          </a:p>
-        </p:txBody>
-      </p:sp>
-      <p:sp>
-        <p:nvSpPr>
-          <p:cNvPr id="7" name="Rectangle 6">
-            <a:extLst>
-              <a:ext uri="{FF2B5EF4-FFF2-40B4-BE49-F238E27FC236}">
-                <a16:creationId xmlns:a16="http://schemas.microsoft.com/office/drawing/2014/main" id="{D4099683-2B56-4402-860F-CE215F42AB6C}"/>
-              </a:ext>
-            </a:extLst>
-          </p:cNvPr>
-          <p:cNvSpPr/>
-          <p:nvPr/>
-        </p:nvSpPr>
-        <p:spPr>
-          <a:xfrm>
-            <a:off x="385396" y="1390929"/>
-            <a:ext cx="11421208" cy="923330"/>
-          </a:xfrm>
-          <a:prstGeom prst="rect">
-            <a:avLst/>
-          </a:prstGeom>
-          <a:noFill/>
-        </p:spPr>
-        <p:txBody>
-          <a:bodyPr wrap="square" lIns="91440" tIns="45720" rIns="91440" bIns="45720">
-            <a:spAutoFit/>
-          </a:bodyPr>
-          <a:lstStyle/>
-          <a:p>
-            <a:pPr algn="ctr"/>
-            <a:r>
-              <a:rPr lang="en-US" sz="5400" b="1" dirty="0">
-                <a:ln w="9525">
-                  <a:solidFill>
-                    <a:schemeClr val="bg1"/>
-                  </a:solidFill>
-                  <a:prstDash val="solid"/>
-                </a:ln>
-                <a:effectLst>
-                  <a:outerShdw blurRad="12700" dist="38100" dir="2700000" algn="tl" rotWithShape="0">
-                    <a:schemeClr val="bg1">
-                      <a:lumMod val="50000"/>
-                    </a:schemeClr>
-                  </a:outerShdw>
-                </a:effectLst>
-              </a:rPr>
-              <a:t>Manager Soccer</a:t>
-            </a:r>
-          </a:p>
-        </p:txBody>
-      </p:sp>
-      <p:sp>
-        <p:nvSpPr>
-          <p:cNvPr id="8" name="Rectangle 7">
-            <a:extLst>
-              <a:ext uri="{FF2B5EF4-FFF2-40B4-BE49-F238E27FC236}">
-                <a16:creationId xmlns:a16="http://schemas.microsoft.com/office/drawing/2014/main" id="{2ECCECF4-B497-4A19-BDD7-7E32AC4E5B2A}"/>
-              </a:ext>
-            </a:extLst>
-          </p:cNvPr>
-          <p:cNvSpPr/>
-          <p:nvPr/>
-        </p:nvSpPr>
-        <p:spPr>
-          <a:xfrm>
-            <a:off x="537796" y="2662082"/>
-            <a:ext cx="11421208" cy="923330"/>
-          </a:xfrm>
-          <a:prstGeom prst="rect">
-            <a:avLst/>
-          </a:prstGeom>
-          <a:noFill/>
-        </p:spPr>
-        <p:txBody>
-          <a:bodyPr wrap="square" lIns="91440" tIns="45720" rIns="91440" bIns="45720">
-            <a:spAutoFit/>
-          </a:bodyPr>
-          <a:lstStyle/>
-          <a:p>
-            <a:pPr algn="ctr"/>
-            <a:r>
-              <a:rPr lang="en-US" sz="5400" b="1" dirty="0">
-                <a:ln w="9525">
-                  <a:solidFill>
-                    <a:schemeClr val="bg1"/>
-                  </a:solidFill>
-                  <a:prstDash val="solid"/>
-                </a:ln>
-                <a:effectLst>
-                  <a:outerShdw blurRad="12700" dist="38100" dir="2700000" algn="tl" rotWithShape="0">
-                    <a:schemeClr val="bg1">
-                      <a:lumMod val="50000"/>
-                    </a:schemeClr>
-                  </a:outerShdw>
-                </a:effectLst>
-              </a:rPr>
-              <a:t>Soccer Admin</a:t>
+              <a:t>Soccer Manager </a:t>
             </a:r>
           </a:p>
         </p:txBody>
@@ -14168,7 +14196,7 @@
         </p:blipFill>
         <p:spPr>
           <a:xfrm>
-            <a:off x="9142576" y="213002"/>
+            <a:off x="5357772" y="3414410"/>
             <a:ext cx="1177927" cy="1177927"/>
           </a:xfrm>
           <a:prstGeom prst="rect">
@@ -14207,7 +14235,7 @@
         </p:blipFill>
         <p:spPr>
           <a:xfrm>
-            <a:off x="786440" y="1309514"/>
+            <a:off x="4067523" y="2119520"/>
             <a:ext cx="2170113" cy="2170113"/>
           </a:xfrm>
           <a:prstGeom prst="rect">
@@ -14246,7 +14274,7 @@
         </p:blipFill>
         <p:spPr>
           <a:xfrm>
-            <a:off x="9578410" y="2548075"/>
+            <a:off x="5607046" y="1917328"/>
             <a:ext cx="1919508" cy="1919508"/>
           </a:xfrm>
           <a:prstGeom prst="rect">
@@ -15774,6 +15802,21 @@
 </file>
 
 <file path=customXml/item1.xml><?xml version="1.0" encoding="utf-8"?>
+<?mso-contentType ?>
+<FormTemplates xmlns="http://schemas.microsoft.com/sharepoint/v3/contenttype/forms">
+  <Display>DocumentLibraryForm</Display>
+  <Edit>DocumentLibraryForm</Edit>
+  <New>DocumentLibraryForm</New>
+</FormTemplates>
+</file>
+
+<file path=customXml/item2.xml><?xml version="1.0" encoding="utf-8"?>
+<p:properties xmlns:p="http://schemas.microsoft.com/office/2006/metadata/properties" xmlns:xsi="http://www.w3.org/2001/XMLSchema-instance" xmlns:pc="http://schemas.microsoft.com/office/infopath/2007/PartnerControls">
+  <documentManagement/>
+</p:properties>
+</file>
+
+<file path=customXml/item3.xml><?xml version="1.0" encoding="utf-8"?>
 <ct:contentTypeSchema xmlns:ct="http://schemas.microsoft.com/office/2006/metadata/contentType" xmlns:ma="http://schemas.microsoft.com/office/2006/metadata/properties/metaAttributes" ct:_="" ma:_="" ma:contentTypeName="Document" ma:contentTypeID="0x010100177509C4CD8734408E22D427542F0D47" ma:contentTypeVersion="20" ma:contentTypeDescription="Create a new document." ma:contentTypeScope="" ma:versionID="e433554a99f97c1262d5db5a8157d533">
   <xsd:schema xmlns:xsd="http://www.w3.org/2001/XMLSchema" xmlns:xs="http://www.w3.org/2001/XMLSchema" xmlns:p="http://schemas.microsoft.com/office/2006/metadata/properties" xmlns:ns2="28ea5bc5-ef92-4009-be37-509f0dcf7721" xmlns:ns3="a40e3ad5-f2e4-4ba3-95a6-e1a17d6ca455" targetNamespace="http://schemas.microsoft.com/office/2006/metadata/properties" ma:root="true" ma:fieldsID="df950b4467bcb6382fb8363937b0a80f" ns2:_="" ns3:_="">
     <xsd:import namespace="28ea5bc5-ef92-4009-be37-509f0dcf7721"/>
@@ -15978,36 +16021,10 @@
 </ct:contentTypeSchema>
 </file>
 
-<file path=customXml/item2.xml><?xml version="1.0" encoding="utf-8"?>
-<p:properties xmlns:p="http://schemas.microsoft.com/office/2006/metadata/properties" xmlns:xsi="http://www.w3.org/2001/XMLSchema-instance" xmlns:pc="http://schemas.microsoft.com/office/infopath/2007/PartnerControls">
-  <documentManagement/>
-</p:properties>
-</file>
-
-<file path=customXml/item3.xml><?xml version="1.0" encoding="utf-8"?>
-<?mso-contentType ?>
-<FormTemplates xmlns="http://schemas.microsoft.com/sharepoint/v3/contenttype/forms">
-  <Display>DocumentLibraryForm</Display>
-  <Edit>DocumentLibraryForm</Edit>
-  <New>DocumentLibraryForm</New>
-</FormTemplates>
-</file>
-
 <file path=customXml/itemProps1.xml><?xml version="1.0" encoding="utf-8"?>
-<ds:datastoreItem xmlns:ds="http://schemas.openxmlformats.org/officeDocument/2006/customXml" ds:itemID="{42F69470-F23D-402A-875D-29F7D793B4A0}">
+<ds:datastoreItem xmlns:ds="http://schemas.openxmlformats.org/officeDocument/2006/customXml" ds:itemID="{C3AE1574-2DFA-4DE8-AC2D-66A9122913A6}">
   <ds:schemaRefs>
-    <ds:schemaRef ds:uri="http://schemas.microsoft.com/office/2006/metadata/contentType"/>
-    <ds:schemaRef ds:uri="http://schemas.microsoft.com/office/2006/metadata/properties/metaAttributes"/>
-    <ds:schemaRef ds:uri="http://www.w3.org/2001/XMLSchema"/>
-    <ds:schemaRef ds:uri="http://schemas.microsoft.com/office/2006/metadata/properties"/>
-    <ds:schemaRef ds:uri="28ea5bc5-ef92-4009-be37-509f0dcf7721"/>
-    <ds:schemaRef ds:uri="a40e3ad5-f2e4-4ba3-95a6-e1a17d6ca455"/>
-    <ds:schemaRef ds:uri="http://schemas.microsoft.com/office/2006/documentManagement/types"/>
-    <ds:schemaRef ds:uri="http://schemas.microsoft.com/office/infopath/2007/PartnerControls"/>
-    <ds:schemaRef ds:uri="http://schemas.openxmlformats.org/package/2006/metadata/core-properties"/>
-    <ds:schemaRef ds:uri="http://purl.org/dc/elements/1.1/"/>
-    <ds:schemaRef ds:uri="http://purl.org/dc/terms/"/>
-    <ds:schemaRef ds:uri="http://schemas.microsoft.com/internal/obd"/>
+    <ds:schemaRef ds:uri="http://schemas.microsoft.com/sharepoint/v3/contenttype/forms"/>
   </ds:schemaRefs>
 </ds:datastoreItem>
 </file>
@@ -16030,9 +16047,20 @@
 </file>
 
 <file path=customXml/itemProps3.xml><?xml version="1.0" encoding="utf-8"?>
-<ds:datastoreItem xmlns:ds="http://schemas.openxmlformats.org/officeDocument/2006/customXml" ds:itemID="{C3AE1574-2DFA-4DE8-AC2D-66A9122913A6}">
+<ds:datastoreItem xmlns:ds="http://schemas.openxmlformats.org/officeDocument/2006/customXml" ds:itemID="{42F69470-F23D-402A-875D-29F7D793B4A0}">
   <ds:schemaRefs>
-    <ds:schemaRef ds:uri="http://schemas.microsoft.com/sharepoint/v3/contenttype/forms"/>
+    <ds:schemaRef ds:uri="http://schemas.microsoft.com/office/2006/metadata/contentType"/>
+    <ds:schemaRef ds:uri="http://schemas.microsoft.com/office/2006/metadata/properties/metaAttributes"/>
+    <ds:schemaRef ds:uri="http://www.w3.org/2001/XMLSchema"/>
+    <ds:schemaRef ds:uri="http://schemas.microsoft.com/office/2006/metadata/properties"/>
+    <ds:schemaRef ds:uri="28ea5bc5-ef92-4009-be37-509f0dcf7721"/>
+    <ds:schemaRef ds:uri="a40e3ad5-f2e4-4ba3-95a6-e1a17d6ca455"/>
+    <ds:schemaRef ds:uri="http://schemas.microsoft.com/office/2006/documentManagement/types"/>
+    <ds:schemaRef ds:uri="http://schemas.microsoft.com/office/infopath/2007/PartnerControls"/>
+    <ds:schemaRef ds:uri="http://schemas.openxmlformats.org/package/2006/metadata/core-properties"/>
+    <ds:schemaRef ds:uri="http://purl.org/dc/elements/1.1/"/>
+    <ds:schemaRef ds:uri="http://purl.org/dc/terms/"/>
+    <ds:schemaRef ds:uri="http://schemas.microsoft.com/internal/obd"/>
   </ds:schemaRefs>
 </ds:datastoreItem>
 </file>
</xml_diff>